<commit_message>
Site updated: 2025-02-07 22:50:31
</commit_message>
<xml_diff>
--- a/2025/01/15/微积分的力量/Infinite.pptx
+++ b/2025/01/15/微积分的力量/Infinite.pptx
@@ -7,6 +7,13 @@
   <p:sldIdLst>
     <p:sldId id="256" r:id="rId3"/>
     <p:sldId id="257" r:id="rId4"/>
+    <p:sldId id="259" r:id="rId5"/>
+    <p:sldId id="260" r:id="rId6"/>
+    <p:sldId id="261" r:id="rId7"/>
+    <p:sldId id="262" r:id="rId8"/>
+    <p:sldId id="263" r:id="rId9"/>
+    <p:sldId id="265" r:id="rId10"/>
+    <p:sldId id="264" r:id="rId11"/>
   </p:sldIdLst>
   <p:sldSz cx="12192000" cy="6858000"/>
   <p:notesSz cx="6858000" cy="9144000"/>
@@ -3178,6 +3185,689 @@
 </p:sld>
 </file>
 
+<file path=ppt/slides/slide3.xml><?xml version="1.0" encoding="utf-8"?>
+<p:sld xmlns:a="http://schemas.openxmlformats.org/drawingml/2006/main" xmlns:r="http://schemas.openxmlformats.org/officeDocument/2006/relationships" xmlns:p="http://schemas.openxmlformats.org/presentationml/2006/main">
+  <p:cSld>
+    <p:spTree>
+      <p:nvGrpSpPr>
+        <p:cNvPr id="1" name=""/>
+        <p:cNvGrpSpPr/>
+        <p:nvPr/>
+      </p:nvGrpSpPr>
+      <p:grpSpPr/>
+      <p:pic>
+        <p:nvPicPr>
+          <p:cNvPr id="2" name="图片 1"/>
+          <p:cNvPicPr>
+            <a:picLocks noChangeAspect="1"/>
+          </p:cNvPicPr>
+          <p:nvPr/>
+        </p:nvPicPr>
+        <p:blipFill>
+          <a:blip r:embed="rId1"/>
+          <a:stretch>
+            <a:fillRect/>
+          </a:stretch>
+        </p:blipFill>
+        <p:spPr>
+          <a:xfrm>
+            <a:off x="740410" y="1803400"/>
+            <a:ext cx="2905760" cy="2008505"/>
+          </a:xfrm>
+          <a:prstGeom prst="rect">
+            <a:avLst/>
+          </a:prstGeom>
+        </p:spPr>
+      </p:pic>
+      <p:pic>
+        <p:nvPicPr>
+          <p:cNvPr id="3" name="图片 2"/>
+          <p:cNvPicPr>
+            <a:picLocks noChangeAspect="1"/>
+          </p:cNvPicPr>
+          <p:nvPr/>
+        </p:nvPicPr>
+        <p:blipFill>
+          <a:blip r:embed="rId2"/>
+          <a:stretch>
+            <a:fillRect/>
+          </a:stretch>
+        </p:blipFill>
+        <p:spPr>
+          <a:xfrm>
+            <a:off x="3874770" y="1475740"/>
+            <a:ext cx="3471545" cy="2244090"/>
+          </a:xfrm>
+          <a:prstGeom prst="rect">
+            <a:avLst/>
+          </a:prstGeom>
+        </p:spPr>
+      </p:pic>
+      <p:pic>
+        <p:nvPicPr>
+          <p:cNvPr id="9" name="图片 8"/>
+          <p:cNvPicPr>
+            <a:picLocks noChangeAspect="1"/>
+          </p:cNvPicPr>
+          <p:nvPr/>
+        </p:nvPicPr>
+        <p:blipFill>
+          <a:blip r:embed="rId3"/>
+          <a:stretch>
+            <a:fillRect/>
+          </a:stretch>
+        </p:blipFill>
+        <p:spPr>
+          <a:xfrm>
+            <a:off x="7865110" y="1475740"/>
+            <a:ext cx="2927985" cy="2336165"/>
+          </a:xfrm>
+          <a:prstGeom prst="rect">
+            <a:avLst/>
+          </a:prstGeom>
+        </p:spPr>
+      </p:pic>
+    </p:spTree>
+  </p:cSld>
+  <p:clrMapOvr>
+    <a:masterClrMapping/>
+  </p:clrMapOvr>
+</p:sld>
+</file>
+
+<file path=ppt/slides/slide4.xml><?xml version="1.0" encoding="utf-8"?>
+<p:sld xmlns:a="http://schemas.openxmlformats.org/drawingml/2006/main" xmlns:r="http://schemas.openxmlformats.org/officeDocument/2006/relationships" xmlns:p="http://schemas.openxmlformats.org/presentationml/2006/main">
+  <p:cSld>
+    <p:spTree>
+      <p:nvGrpSpPr>
+        <p:cNvPr id="1" name=""/>
+        <p:cNvGrpSpPr/>
+        <p:nvPr/>
+      </p:nvGrpSpPr>
+      <p:grpSpPr/>
+      <p:pic>
+        <p:nvPicPr>
+          <p:cNvPr id="2" name="图片 1"/>
+          <p:cNvPicPr>
+            <a:picLocks noChangeAspect="1"/>
+          </p:cNvPicPr>
+          <p:nvPr/>
+        </p:nvPicPr>
+        <p:blipFill>
+          <a:blip r:embed="rId1"/>
+          <a:stretch>
+            <a:fillRect/>
+          </a:stretch>
+        </p:blipFill>
+        <p:spPr>
+          <a:xfrm>
+            <a:off x="1048385" y="1108710"/>
+            <a:ext cx="4601210" cy="1766570"/>
+          </a:xfrm>
+          <a:prstGeom prst="rect">
+            <a:avLst/>
+          </a:prstGeom>
+        </p:spPr>
+      </p:pic>
+      <p:pic>
+        <p:nvPicPr>
+          <p:cNvPr id="3" name="图片 2"/>
+          <p:cNvPicPr>
+            <a:picLocks noChangeAspect="1"/>
+          </p:cNvPicPr>
+          <p:nvPr/>
+        </p:nvPicPr>
+        <p:blipFill>
+          <a:blip r:embed="rId2"/>
+          <a:stretch>
+            <a:fillRect/>
+          </a:stretch>
+        </p:blipFill>
+        <p:spPr>
+          <a:xfrm>
+            <a:off x="6001385" y="993140"/>
+            <a:ext cx="4763770" cy="1766570"/>
+          </a:xfrm>
+          <a:prstGeom prst="rect">
+            <a:avLst/>
+          </a:prstGeom>
+        </p:spPr>
+      </p:pic>
+      <p:pic>
+        <p:nvPicPr>
+          <p:cNvPr id="4" name="图片 3"/>
+          <p:cNvPicPr>
+            <a:picLocks noChangeAspect="1"/>
+          </p:cNvPicPr>
+          <p:nvPr/>
+        </p:nvPicPr>
+        <p:blipFill>
+          <a:blip r:embed="rId3"/>
+          <a:stretch>
+            <a:fillRect/>
+          </a:stretch>
+        </p:blipFill>
+        <p:spPr>
+          <a:xfrm>
+            <a:off x="1397000" y="3302000"/>
+            <a:ext cx="3655695" cy="2152015"/>
+          </a:xfrm>
+          <a:prstGeom prst="rect">
+            <a:avLst/>
+          </a:prstGeom>
+        </p:spPr>
+      </p:pic>
+      <p:pic>
+        <p:nvPicPr>
+          <p:cNvPr id="5" name="图片 4"/>
+          <p:cNvPicPr>
+            <a:picLocks noChangeAspect="1"/>
+          </p:cNvPicPr>
+          <p:nvPr/>
+        </p:nvPicPr>
+        <p:blipFill>
+          <a:blip r:embed="rId4"/>
+          <a:stretch>
+            <a:fillRect/>
+          </a:stretch>
+        </p:blipFill>
+        <p:spPr>
+          <a:xfrm>
+            <a:off x="6291580" y="3302000"/>
+            <a:ext cx="3539490" cy="2152650"/>
+          </a:xfrm>
+          <a:prstGeom prst="rect">
+            <a:avLst/>
+          </a:prstGeom>
+        </p:spPr>
+      </p:pic>
+    </p:spTree>
+  </p:cSld>
+  <p:clrMapOvr>
+    <a:masterClrMapping/>
+  </p:clrMapOvr>
+</p:sld>
+</file>
+
+<file path=ppt/slides/slide5.xml><?xml version="1.0" encoding="utf-8"?>
+<p:sld xmlns:a="http://schemas.openxmlformats.org/drawingml/2006/main" xmlns:r="http://schemas.openxmlformats.org/officeDocument/2006/relationships" xmlns:p="http://schemas.openxmlformats.org/presentationml/2006/main">
+  <p:cSld>
+    <p:spTree>
+      <p:nvGrpSpPr>
+        <p:cNvPr id="1" name=""/>
+        <p:cNvGrpSpPr/>
+        <p:nvPr/>
+      </p:nvGrpSpPr>
+      <p:grpSpPr/>
+      <p:pic>
+        <p:nvPicPr>
+          <p:cNvPr id="2" name="图片 1"/>
+          <p:cNvPicPr>
+            <a:picLocks noChangeAspect="1"/>
+          </p:cNvPicPr>
+          <p:nvPr/>
+        </p:nvPicPr>
+        <p:blipFill>
+          <a:blip r:embed="rId1"/>
+          <a:stretch>
+            <a:fillRect/>
+          </a:stretch>
+        </p:blipFill>
+        <p:spPr>
+          <a:xfrm>
+            <a:off x="3463290" y="1847215"/>
+            <a:ext cx="4791075" cy="3392170"/>
+          </a:xfrm>
+          <a:prstGeom prst="rect">
+            <a:avLst/>
+          </a:prstGeom>
+        </p:spPr>
+      </p:pic>
+    </p:spTree>
+  </p:cSld>
+  <p:clrMapOvr>
+    <a:masterClrMapping/>
+  </p:clrMapOvr>
+</p:sld>
+</file>
+
+<file path=ppt/slides/slide6.xml><?xml version="1.0" encoding="utf-8"?>
+<p:sld xmlns:a="http://schemas.openxmlformats.org/drawingml/2006/main" xmlns:r="http://schemas.openxmlformats.org/officeDocument/2006/relationships" xmlns:p="http://schemas.openxmlformats.org/presentationml/2006/main">
+  <p:cSld>
+    <p:spTree>
+      <p:nvGrpSpPr>
+        <p:cNvPr id="1" name=""/>
+        <p:cNvGrpSpPr/>
+        <p:nvPr/>
+      </p:nvGrpSpPr>
+      <p:grpSpPr/>
+      <p:grpSp>
+        <p:nvGrpSpPr>
+          <p:cNvPr id="4" name="组合 3"/>
+          <p:cNvGrpSpPr/>
+          <p:nvPr/>
+        </p:nvGrpSpPr>
+        <p:grpSpPr>
+          <a:xfrm>
+            <a:off x="1616710" y="1504950"/>
+            <a:ext cx="6403975" cy="1137920"/>
+            <a:chOff x="2546" y="2370"/>
+            <a:chExt cx="10085" cy="1792"/>
+          </a:xfrm>
+        </p:grpSpPr>
+        <p:pic>
+          <p:nvPicPr>
+            <p:cNvPr id="2" name="图片 1"/>
+            <p:cNvPicPr>
+              <a:picLocks noChangeAspect="1"/>
+            </p:cNvPicPr>
+            <p:nvPr/>
+          </p:nvPicPr>
+          <p:blipFill>
+            <a:blip r:embed="rId1"/>
+            <a:stretch>
+              <a:fillRect/>
+            </a:stretch>
+          </p:blipFill>
+          <p:spPr>
+            <a:xfrm>
+              <a:off x="5193" y="2370"/>
+              <a:ext cx="7439" cy="1793"/>
+            </a:xfrm>
+            <a:prstGeom prst="rect">
+              <a:avLst/>
+            </a:prstGeom>
+          </p:spPr>
+        </p:pic>
+        <p:pic>
+          <p:nvPicPr>
+            <p:cNvPr id="3" name="图片 2"/>
+            <p:cNvPicPr>
+              <a:picLocks noChangeAspect="1"/>
+            </p:cNvPicPr>
+            <p:nvPr/>
+          </p:nvPicPr>
+          <p:blipFill>
+            <a:blip r:embed="rId2"/>
+            <a:stretch>
+              <a:fillRect/>
+            </a:stretch>
+          </p:blipFill>
+          <p:spPr>
+            <a:xfrm>
+              <a:off x="2546" y="2370"/>
+              <a:ext cx="2464" cy="1742"/>
+            </a:xfrm>
+            <a:prstGeom prst="rect">
+              <a:avLst/>
+            </a:prstGeom>
+          </p:spPr>
+        </p:pic>
+      </p:grpSp>
+    </p:spTree>
+  </p:cSld>
+  <p:clrMapOvr>
+    <a:masterClrMapping/>
+  </p:clrMapOvr>
+</p:sld>
+</file>
+
+<file path=ppt/slides/slide7.xml><?xml version="1.0" encoding="utf-8"?>
+<p:sld xmlns:a="http://schemas.openxmlformats.org/drawingml/2006/main" xmlns:r="http://schemas.openxmlformats.org/officeDocument/2006/relationships" xmlns:p="http://schemas.openxmlformats.org/presentationml/2006/main">
+  <p:cSld>
+    <p:spTree>
+      <p:nvGrpSpPr>
+        <p:cNvPr id="1" name=""/>
+        <p:cNvGrpSpPr/>
+        <p:nvPr/>
+      </p:nvGrpSpPr>
+      <p:grpSpPr/>
+      <p:pic>
+        <p:nvPicPr>
+          <p:cNvPr id="2" name="图片 1"/>
+          <p:cNvPicPr>
+            <a:picLocks noChangeAspect="1"/>
+          </p:cNvPicPr>
+          <p:nvPr/>
+        </p:nvPicPr>
+        <p:blipFill>
+          <a:blip r:embed="rId1"/>
+          <a:stretch>
+            <a:fillRect/>
+          </a:stretch>
+        </p:blipFill>
+        <p:spPr>
+          <a:xfrm>
+            <a:off x="1143000" y="1139825"/>
+            <a:ext cx="4537710" cy="2781935"/>
+          </a:xfrm>
+          <a:prstGeom prst="rect">
+            <a:avLst/>
+          </a:prstGeom>
+        </p:spPr>
+      </p:pic>
+      <p:pic>
+        <p:nvPicPr>
+          <p:cNvPr id="3" name="图片 2"/>
+          <p:cNvPicPr>
+            <a:picLocks noChangeAspect="1"/>
+          </p:cNvPicPr>
+          <p:nvPr/>
+        </p:nvPicPr>
+        <p:blipFill>
+          <a:blip r:embed="rId2"/>
+          <a:stretch>
+            <a:fillRect/>
+          </a:stretch>
+        </p:blipFill>
+        <p:spPr>
+          <a:xfrm>
+            <a:off x="9035415" y="1613535"/>
+            <a:ext cx="2341880" cy="979170"/>
+          </a:xfrm>
+          <a:prstGeom prst="rect">
+            <a:avLst/>
+          </a:prstGeom>
+        </p:spPr>
+      </p:pic>
+      <p:sp>
+        <p:nvSpPr>
+          <p:cNvPr id="4" name="文本框 3"/>
+          <p:cNvSpPr txBox="1"/>
+          <p:nvPr/>
+        </p:nvSpPr>
+        <p:spPr>
+          <a:xfrm>
+            <a:off x="6251575" y="1708150"/>
+            <a:ext cx="2621280" cy="645160"/>
+          </a:xfrm>
+          <a:prstGeom prst="rect">
+            <a:avLst/>
+          </a:prstGeom>
+          <a:noFill/>
+        </p:spPr>
+        <p:txBody>
+          <a:bodyPr wrap="square" rtlCol="0">
+            <a:spAutoFit/>
+          </a:bodyPr>
+          <a:p>
+            <a:pPr algn="ctr"/>
+            <a:r>
+              <a:rPr lang="en-US" altLang="zh-CN" sz="3600">
+                <a:latin typeface="Times New Roman" panose="02020603050405020304" charset="0"/>
+                <a:ea typeface="宋体" panose="02010600030101010101" pitchFamily="2" charset="-122"/>
+                <a:cs typeface="Times New Roman" panose="02020603050405020304" charset="0"/>
+              </a:rPr>
+              <a:t>dA = f(x)dx</a:t>
+            </a:r>
+            <a:endParaRPr lang="en-US" altLang="zh-CN" sz="3600">
+              <a:latin typeface="Times New Roman" panose="02020603050405020304" charset="0"/>
+              <a:ea typeface="宋体" panose="02010600030101010101" pitchFamily="2" charset="-122"/>
+              <a:cs typeface="Times New Roman" panose="02020603050405020304" charset="0"/>
+            </a:endParaRPr>
+          </a:p>
+        </p:txBody>
+      </p:sp>
+      <p:pic>
+        <p:nvPicPr>
+          <p:cNvPr id="5" name="图片 4"/>
+          <p:cNvPicPr>
+            <a:picLocks noChangeAspect="1"/>
+          </p:cNvPicPr>
+          <p:nvPr/>
+        </p:nvPicPr>
+        <p:blipFill>
+          <a:blip r:embed="rId3"/>
+          <a:stretch>
+            <a:fillRect/>
+          </a:stretch>
+        </p:blipFill>
+        <p:spPr>
+          <a:xfrm>
+            <a:off x="6411595" y="2592705"/>
+            <a:ext cx="2623820" cy="836295"/>
+          </a:xfrm>
+          <a:prstGeom prst="rect">
+            <a:avLst/>
+          </a:prstGeom>
+        </p:spPr>
+      </p:pic>
+    </p:spTree>
+  </p:cSld>
+  <p:clrMapOvr>
+    <a:masterClrMapping/>
+  </p:clrMapOvr>
+</p:sld>
+</file>
+
+<file path=ppt/slides/slide8.xml><?xml version="1.0" encoding="utf-8"?>
+<p:sld xmlns:a="http://schemas.openxmlformats.org/drawingml/2006/main" xmlns:r="http://schemas.openxmlformats.org/officeDocument/2006/relationships" xmlns:p="http://schemas.openxmlformats.org/presentationml/2006/main">
+  <p:cSld>
+    <p:spTree>
+      <p:nvGrpSpPr>
+        <p:cNvPr id="1" name=""/>
+        <p:cNvGrpSpPr/>
+        <p:nvPr/>
+      </p:nvGrpSpPr>
+      <p:grpSpPr/>
+      <p:pic>
+        <p:nvPicPr>
+          <p:cNvPr id="2" name="图片 1"/>
+          <p:cNvPicPr>
+            <a:picLocks noChangeAspect="1"/>
+          </p:cNvPicPr>
+          <p:nvPr/>
+        </p:nvPicPr>
+        <p:blipFill>
+          <a:blip r:embed="rId1"/>
+          <a:stretch>
+            <a:fillRect/>
+          </a:stretch>
+        </p:blipFill>
+        <p:spPr>
+          <a:xfrm>
+            <a:off x="1270635" y="732155"/>
+            <a:ext cx="4694555" cy="751840"/>
+          </a:xfrm>
+          <a:prstGeom prst="rect">
+            <a:avLst/>
+          </a:prstGeom>
+        </p:spPr>
+      </p:pic>
+      <p:pic>
+        <p:nvPicPr>
+          <p:cNvPr id="3" name="图片 2"/>
+          <p:cNvPicPr>
+            <a:picLocks noChangeAspect="1"/>
+          </p:cNvPicPr>
+          <p:nvPr/>
+        </p:nvPicPr>
+        <p:blipFill>
+          <a:blip r:embed="rId2"/>
+          <a:stretch>
+            <a:fillRect/>
+          </a:stretch>
+        </p:blipFill>
+        <p:spPr>
+          <a:xfrm>
+            <a:off x="1188085" y="1743710"/>
+            <a:ext cx="5781040" cy="793115"/>
+          </a:xfrm>
+          <a:prstGeom prst="rect">
+            <a:avLst/>
+          </a:prstGeom>
+        </p:spPr>
+      </p:pic>
+      <p:pic>
+        <p:nvPicPr>
+          <p:cNvPr id="4" name="图片 3"/>
+          <p:cNvPicPr>
+            <a:picLocks noChangeAspect="1"/>
+          </p:cNvPicPr>
+          <p:nvPr/>
+        </p:nvPicPr>
+        <p:blipFill>
+          <a:blip r:embed="rId3"/>
+          <a:stretch>
+            <a:fillRect/>
+          </a:stretch>
+        </p:blipFill>
+        <p:spPr>
+          <a:xfrm>
+            <a:off x="1188085" y="2658745"/>
+            <a:ext cx="6781165" cy="874395"/>
+          </a:xfrm>
+          <a:prstGeom prst="rect">
+            <a:avLst/>
+          </a:prstGeom>
+        </p:spPr>
+      </p:pic>
+      <p:pic>
+        <p:nvPicPr>
+          <p:cNvPr id="5" name="图片 4"/>
+          <p:cNvPicPr>
+            <a:picLocks noChangeAspect="1"/>
+          </p:cNvPicPr>
+          <p:nvPr/>
+        </p:nvPicPr>
+        <p:blipFill>
+          <a:blip r:embed="rId4"/>
+          <a:stretch>
+            <a:fillRect/>
+          </a:stretch>
+        </p:blipFill>
+        <p:spPr>
+          <a:xfrm>
+            <a:off x="1270635" y="3793490"/>
+            <a:ext cx="1591945" cy="714375"/>
+          </a:xfrm>
+          <a:prstGeom prst="rect">
+            <a:avLst/>
+          </a:prstGeom>
+        </p:spPr>
+      </p:pic>
+      <p:pic>
+        <p:nvPicPr>
+          <p:cNvPr id="7" name="图片 6"/>
+          <p:cNvPicPr>
+            <a:picLocks noChangeAspect="1"/>
+          </p:cNvPicPr>
+          <p:nvPr/>
+        </p:nvPicPr>
+        <p:blipFill>
+          <a:blip r:embed="rId5"/>
+          <a:stretch>
+            <a:fillRect/>
+          </a:stretch>
+        </p:blipFill>
+        <p:spPr>
+          <a:xfrm>
+            <a:off x="8176895" y="1229995"/>
+            <a:ext cx="3352165" cy="2706370"/>
+          </a:xfrm>
+          <a:prstGeom prst="rect">
+            <a:avLst/>
+          </a:prstGeom>
+        </p:spPr>
+      </p:pic>
+    </p:spTree>
+  </p:cSld>
+  <p:clrMapOvr>
+    <a:masterClrMapping/>
+  </p:clrMapOvr>
+</p:sld>
+</file>
+
+<file path=ppt/slides/slide9.xml><?xml version="1.0" encoding="utf-8"?>
+<p:sld xmlns:a="http://schemas.openxmlformats.org/drawingml/2006/main" xmlns:r="http://schemas.openxmlformats.org/officeDocument/2006/relationships" xmlns:p="http://schemas.openxmlformats.org/presentationml/2006/main">
+  <p:cSld>
+    <p:spTree>
+      <p:nvGrpSpPr>
+        <p:cNvPr id="1" name=""/>
+        <p:cNvGrpSpPr/>
+        <p:nvPr/>
+      </p:nvGrpSpPr>
+      <p:grpSpPr/>
+      <p:pic>
+        <p:nvPicPr>
+          <p:cNvPr id="2" name="图片 1"/>
+          <p:cNvPicPr>
+            <a:picLocks noChangeAspect="1"/>
+          </p:cNvPicPr>
+          <p:nvPr/>
+        </p:nvPicPr>
+        <p:blipFill>
+          <a:blip r:embed="rId1"/>
+          <a:stretch>
+            <a:fillRect/>
+          </a:stretch>
+        </p:blipFill>
+        <p:spPr>
+          <a:xfrm>
+            <a:off x="1035685" y="1296670"/>
+            <a:ext cx="3974465" cy="3329305"/>
+          </a:xfrm>
+          <a:prstGeom prst="rect">
+            <a:avLst/>
+          </a:prstGeom>
+        </p:spPr>
+      </p:pic>
+      <p:pic>
+        <p:nvPicPr>
+          <p:cNvPr id="3" name="图片 2"/>
+          <p:cNvPicPr>
+            <a:picLocks noChangeAspect="1"/>
+          </p:cNvPicPr>
+          <p:nvPr/>
+        </p:nvPicPr>
+        <p:blipFill>
+          <a:blip r:embed="rId2"/>
+          <a:stretch>
+            <a:fillRect/>
+          </a:stretch>
+        </p:blipFill>
+        <p:spPr>
+          <a:xfrm>
+            <a:off x="5495290" y="1296670"/>
+            <a:ext cx="2209165" cy="2594610"/>
+          </a:xfrm>
+          <a:prstGeom prst="rect">
+            <a:avLst/>
+          </a:prstGeom>
+        </p:spPr>
+      </p:pic>
+      <p:pic>
+        <p:nvPicPr>
+          <p:cNvPr id="5" name="图片 4"/>
+          <p:cNvPicPr>
+            <a:picLocks noChangeAspect="1"/>
+          </p:cNvPicPr>
+          <p:nvPr/>
+        </p:nvPicPr>
+        <p:blipFill>
+          <a:blip r:embed="rId3"/>
+          <a:stretch>
+            <a:fillRect/>
+          </a:stretch>
+        </p:blipFill>
+        <p:spPr>
+          <a:xfrm>
+            <a:off x="5257165" y="4032250"/>
+            <a:ext cx="2886710" cy="593725"/>
+          </a:xfrm>
+          <a:prstGeom prst="rect">
+            <a:avLst/>
+          </a:prstGeom>
+        </p:spPr>
+      </p:pic>
+    </p:spTree>
+  </p:cSld>
+  <p:clrMapOvr>
+    <a:masterClrMapping/>
+  </p:clrMapOvr>
+</p:sld>
+</file>
+
 <file path=ppt/theme/theme1.xml><?xml version="1.0" encoding="utf-8"?>
 <a:theme xmlns:a="http://schemas.openxmlformats.org/drawingml/2006/main" name="WPS">
   <a:themeElements>

</xml_diff>